<commit_message>
Adding Day 4 Code Examples
</commit_message>
<xml_diff>
--- a/powerpoints/Roc_Day04 - OOP_Pillars.pptx
+++ b/powerpoints/Roc_Day04 - OOP_Pillars.pptx
@@ -45018,10 +45018,10 @@
               <a:buNone/>
             </a:pPr>
             <a:r>
-              <a:rPr lang="en-US"/>
+              <a:rPr lang="en-US" dirty="0"/>
               <a:t>“Coding to the Interface”</a:t>
             </a:r>
-            <a:endParaRPr/>
+            <a:endParaRPr dirty="0"/>
           </a:p>
         </p:txBody>
       </p:sp>

</xml_diff>